<commit_message>
Update itk asic presentation.pptx
</commit_message>
<xml_diff>
--- a/itk asic presentation.pptx
+++ b/itk asic presentation.pptx
@@ -5065,6 +5065,44 @@
             <a:pPr>
               <a:buFont typeface="Arial" panose="020B0604020202020204" pitchFamily="34" charset="0"/>
               <a:buChar char="•"/>
+            </a:pPr>
+            <a:r>
+              <a:rPr lang="de-DE" dirty="0">
+                <a:latin typeface="Times New Roman" panose="02020603050405020304" pitchFamily="18" charset="0"/>
+                <a:cs typeface="Times New Roman" panose="02020603050405020304" pitchFamily="18" charset="0"/>
+              </a:rPr>
+              <a:t> New </a:t>
+            </a:r>
+            <a:r>
+              <a:rPr lang="de-DE" dirty="0" err="1">
+                <a:latin typeface="Times New Roman" panose="02020603050405020304" pitchFamily="18" charset="0"/>
+                <a:cs typeface="Times New Roman" panose="02020603050405020304" pitchFamily="18" charset="0"/>
+              </a:rPr>
+              <a:t>version</a:t>
+            </a:r>
+            <a:r>
+              <a:rPr lang="de-DE" dirty="0">
+                <a:latin typeface="Times New Roman" panose="02020603050405020304" pitchFamily="18" charset="0"/>
+                <a:cs typeface="Times New Roman" panose="02020603050405020304" pitchFamily="18" charset="0"/>
+              </a:rPr>
+              <a:t>: </a:t>
+            </a:r>
+            <a:r>
+              <a:rPr lang="en-GB" dirty="0">
+                <a:latin typeface="Times New Roman" panose="02020603050405020304" pitchFamily="18" charset="0"/>
+                <a:cs typeface="Times New Roman" panose="02020603050405020304" pitchFamily="18" charset="0"/>
+                <a:hlinkClick r:id="rId3"/>
+              </a:rPr>
+              <a:t>https://github.com/gretagoldberg/Register_Converter.git</a:t>
+            </a:r>
+            <a:endParaRPr lang="en-GB" dirty="0">
+              <a:latin typeface="Times New Roman" panose="02020603050405020304" pitchFamily="18" charset="0"/>
+              <a:cs typeface="Times New Roman" panose="02020603050405020304" pitchFamily="18" charset="0"/>
+            </a:endParaRPr>
+          </a:p>
+          <a:p>
+            <a:pPr marL="0" indent="0">
+              <a:buNone/>
             </a:pPr>
             <a:endParaRPr lang="de-DE" dirty="0">
               <a:latin typeface="Times New Roman" panose="02020603050405020304" pitchFamily="18" charset="0"/>

</xml_diff>